<commit_message>
Introduced groups for shared product pools
</commit_message>
<xml_diff>
--- a/CaravanSeraiCS360/Presentations/Caravanserai.pptx
+++ b/CaravanSeraiCS360/Presentations/Caravanserai.pptx
@@ -5,19 +5,20 @@
     <p:sldMasterId id="2147483728" r:id="rId4"/>
   </p:sldMasterIdLst>
   <p:notesMasterIdLst>
-    <p:notesMasterId r:id="rId12"/>
+    <p:notesMasterId r:id="rId13"/>
   </p:notesMasterIdLst>
   <p:handoutMasterIdLst>
-    <p:handoutMasterId r:id="rId13"/>
+    <p:handoutMasterId r:id="rId14"/>
   </p:handoutMasterIdLst>
   <p:sldIdLst>
     <p:sldId id="296" r:id="rId5"/>
     <p:sldId id="323" r:id="rId6"/>
     <p:sldId id="312" r:id="rId7"/>
     <p:sldId id="319" r:id="rId8"/>
-    <p:sldId id="324" r:id="rId9"/>
-    <p:sldId id="313" r:id="rId10"/>
-    <p:sldId id="321" r:id="rId11"/>
+    <p:sldId id="325" r:id="rId9"/>
+    <p:sldId id="326" r:id="rId10"/>
+    <p:sldId id="324" r:id="rId11"/>
+    <p:sldId id="321" r:id="rId12"/>
   </p:sldIdLst>
   <p:sldSz cx="12192000" cy="6858000"/>
   <p:notesSz cx="6858000" cy="9144000"/>
@@ -6516,6 +6517,346 @@
         <p:cNvPr id="1" name="">
           <a:extLst>
             <a:ext uri="{FF2B5EF4-FFF2-40B4-BE49-F238E27FC236}">
+              <a16:creationId xmlns:a16="http://schemas.microsoft.com/office/drawing/2014/main" id="{68DE51DF-2955-FC95-AF5A-1C08E9533E6D}"/>
+            </a:ext>
+          </a:extLst>
+        </p:cNvPr>
+        <p:cNvGrpSpPr/>
+        <p:nvPr/>
+      </p:nvGrpSpPr>
+      <p:grpSpPr>
+        <a:xfrm>
+          <a:off x="0" y="0"/>
+          <a:ext cx="0" cy="0"/>
+          <a:chOff x="0" y="0"/>
+          <a:chExt cx="0" cy="0"/>
+        </a:xfrm>
+      </p:grpSpPr>
+      <p:sp>
+        <p:nvSpPr>
+          <p:cNvPr id="2" name="Title 1">
+            <a:extLst>
+              <a:ext uri="{FF2B5EF4-FFF2-40B4-BE49-F238E27FC236}">
+                <a16:creationId xmlns:a16="http://schemas.microsoft.com/office/drawing/2014/main" id="{EF8D8013-2487-EBF4-E918-74E290A7CE05}"/>
+              </a:ext>
+            </a:extLst>
+          </p:cNvPr>
+          <p:cNvSpPr>
+            <a:spLocks noGrp="1"/>
+          </p:cNvSpPr>
+          <p:nvPr>
+            <p:ph type="title"/>
+          </p:nvPr>
+        </p:nvSpPr>
+        <p:spPr/>
+        <p:txBody>
+          <a:bodyPr/>
+          <a:lstStyle/>
+          <a:p>
+            <a:r>
+              <a:rPr lang="en-US" dirty="0"/>
+              <a:t>What we have Built</a:t>
+            </a:r>
+          </a:p>
+        </p:txBody>
+      </p:sp>
+      <p:sp>
+        <p:nvSpPr>
+          <p:cNvPr id="5" name="Content Placeholder 4">
+            <a:extLst>
+              <a:ext uri="{FF2B5EF4-FFF2-40B4-BE49-F238E27FC236}">
+                <a16:creationId xmlns:a16="http://schemas.microsoft.com/office/drawing/2014/main" id="{F4C745E6-4539-0C52-7C42-2E2793749305}"/>
+              </a:ext>
+            </a:extLst>
+          </p:cNvPr>
+          <p:cNvSpPr>
+            <a:spLocks noGrp="1"/>
+          </p:cNvSpPr>
+          <p:nvPr>
+            <p:ph sz="quarter" idx="17"/>
+          </p:nvPr>
+        </p:nvSpPr>
+        <p:spPr/>
+        <p:txBody>
+          <a:bodyPr/>
+          <a:lstStyle/>
+          <a:p>
+            <a:pPr marL="342900" indent="-342900">
+              <a:buFont typeface="Arial" panose="020B0604020202020204" pitchFamily="34" charset="0"/>
+              <a:buChar char="•"/>
+            </a:pPr>
+            <a:r>
+              <a:rPr lang="en-US" sz="2400" dirty="0"/>
+              <a:t>Functional login logout system</a:t>
+            </a:r>
+          </a:p>
+          <a:p>
+            <a:pPr marL="342900" indent="-342900">
+              <a:buFont typeface="Arial" panose="020B0604020202020204" pitchFamily="34" charset="0"/>
+              <a:buChar char="•"/>
+            </a:pPr>
+            <a:endParaRPr lang="en-US" sz="2400" dirty="0"/>
+          </a:p>
+          <a:p>
+            <a:pPr marL="342900" indent="-342900">
+              <a:buFont typeface="Arial" panose="020B0604020202020204" pitchFamily="34" charset="0"/>
+              <a:buChar char="•"/>
+            </a:pPr>
+            <a:r>
+              <a:rPr lang="en-US" sz="2400" dirty="0"/>
+              <a:t>Cart system for taking products from database</a:t>
+            </a:r>
+          </a:p>
+          <a:p>
+            <a:pPr marL="342900" indent="-342900">
+              <a:buFont typeface="Arial" panose="020B0604020202020204" pitchFamily="34" charset="0"/>
+              <a:buChar char="•"/>
+            </a:pPr>
+            <a:endParaRPr lang="en-US" sz="2400" dirty="0"/>
+          </a:p>
+          <a:p>
+            <a:pPr marL="342900" indent="-342900">
+              <a:buFont typeface="Arial" panose="020B0604020202020204" pitchFamily="34" charset="0"/>
+              <a:buChar char="•"/>
+            </a:pPr>
+            <a:r>
+              <a:rPr lang="en-US" sz="2400" dirty="0"/>
+              <a:t>Barter system for exchange of products existing on database</a:t>
+            </a:r>
+          </a:p>
+          <a:p>
+            <a:pPr marL="342900" indent="-342900">
+              <a:buFont typeface="Arial" panose="020B0604020202020204" pitchFamily="34" charset="0"/>
+              <a:buChar char="•"/>
+            </a:pPr>
+            <a:endParaRPr lang="en-US" sz="2400" dirty="0"/>
+          </a:p>
+          <a:p>
+            <a:pPr marL="342900" indent="-342900">
+              <a:buFont typeface="Arial" panose="020B0604020202020204" pitchFamily="34" charset="0"/>
+              <a:buChar char="•"/>
+            </a:pPr>
+            <a:r>
+              <a:rPr lang="en-US" sz="2400" dirty="0"/>
+              <a:t>Functional frontend</a:t>
+            </a:r>
+          </a:p>
+        </p:txBody>
+      </p:sp>
+      <p:sp>
+        <p:nvSpPr>
+          <p:cNvPr id="4" name="Slide Number Placeholder 3">
+            <a:extLst>
+              <a:ext uri="{FF2B5EF4-FFF2-40B4-BE49-F238E27FC236}">
+                <a16:creationId xmlns:a16="http://schemas.microsoft.com/office/drawing/2014/main" id="{2FC774DF-48D9-BD36-4C0A-93706A0304B7}"/>
+              </a:ext>
+            </a:extLst>
+          </p:cNvPr>
+          <p:cNvSpPr>
+            <a:spLocks noGrp="1"/>
+          </p:cNvSpPr>
+          <p:nvPr>
+            <p:ph type="sldNum" sz="quarter" idx="12"/>
+          </p:nvPr>
+        </p:nvSpPr>
+        <p:spPr/>
+        <p:txBody>
+          <a:bodyPr/>
+          <a:lstStyle/>
+          <a:p>
+            <a:fld id="{C01389E6-C847-4AD0-B56D-D205B2EAB1EE}" type="slidenum">
+              <a:rPr lang="en-US" smtClean="0"/>
+              <a:pPr/>
+              <a:t>5</a:t>
+            </a:fld>
+            <a:endParaRPr lang="en-US" dirty="0"/>
+          </a:p>
+        </p:txBody>
+      </p:sp>
+    </p:spTree>
+    <p:extLst>
+      <p:ext uri="{BB962C8B-B14F-4D97-AF65-F5344CB8AC3E}">
+        <p14:creationId xmlns:p14="http://schemas.microsoft.com/office/powerpoint/2010/main" val="2642184838"/>
+      </p:ext>
+    </p:extLst>
+  </p:cSld>
+  <p:clrMapOvr>
+    <a:masterClrMapping/>
+  </p:clrMapOvr>
+</p:sld>
+</file>
+
+<file path=ppt/slides/slide6.xml><?xml version="1.0" encoding="utf-8"?>
+<p:sld xmlns:a="http://schemas.openxmlformats.org/drawingml/2006/main" xmlns:r="http://schemas.openxmlformats.org/officeDocument/2006/relationships" xmlns:p="http://schemas.openxmlformats.org/presentationml/2006/main">
+  <p:cSld>
+    <p:spTree>
+      <p:nvGrpSpPr>
+        <p:cNvPr id="1" name="">
+          <a:extLst>
+            <a:ext uri="{FF2B5EF4-FFF2-40B4-BE49-F238E27FC236}">
+              <a16:creationId xmlns:a16="http://schemas.microsoft.com/office/drawing/2014/main" id="{F97E430D-E367-BCF4-F9B2-0A8F5EAFD4CB}"/>
+            </a:ext>
+          </a:extLst>
+        </p:cNvPr>
+        <p:cNvGrpSpPr/>
+        <p:nvPr/>
+      </p:nvGrpSpPr>
+      <p:grpSpPr>
+        <a:xfrm>
+          <a:off x="0" y="0"/>
+          <a:ext cx="0" cy="0"/>
+          <a:chOff x="0" y="0"/>
+          <a:chExt cx="0" cy="0"/>
+        </a:xfrm>
+      </p:grpSpPr>
+      <p:sp>
+        <p:nvSpPr>
+          <p:cNvPr id="2" name="Title 1">
+            <a:extLst>
+              <a:ext uri="{FF2B5EF4-FFF2-40B4-BE49-F238E27FC236}">
+                <a16:creationId xmlns:a16="http://schemas.microsoft.com/office/drawing/2014/main" id="{5EBE2311-3325-CBF4-5ACF-C5BD2E2F7688}"/>
+              </a:ext>
+            </a:extLst>
+          </p:cNvPr>
+          <p:cNvSpPr>
+            <a:spLocks noGrp="1"/>
+          </p:cNvSpPr>
+          <p:nvPr>
+            <p:ph type="title"/>
+          </p:nvPr>
+        </p:nvSpPr>
+        <p:spPr/>
+        <p:txBody>
+          <a:bodyPr/>
+          <a:lstStyle/>
+          <a:p>
+            <a:r>
+              <a:rPr lang="en-US" dirty="0"/>
+              <a:t>What IS TO COME</a:t>
+            </a:r>
+          </a:p>
+        </p:txBody>
+      </p:sp>
+      <p:sp>
+        <p:nvSpPr>
+          <p:cNvPr id="5" name="Content Placeholder 4">
+            <a:extLst>
+              <a:ext uri="{FF2B5EF4-FFF2-40B4-BE49-F238E27FC236}">
+                <a16:creationId xmlns:a16="http://schemas.microsoft.com/office/drawing/2014/main" id="{AA9FBF88-749E-2130-9071-9FED806754CB}"/>
+              </a:ext>
+            </a:extLst>
+          </p:cNvPr>
+          <p:cNvSpPr>
+            <a:spLocks noGrp="1"/>
+          </p:cNvSpPr>
+          <p:nvPr>
+            <p:ph sz="quarter" idx="17"/>
+          </p:nvPr>
+        </p:nvSpPr>
+        <p:spPr/>
+        <p:txBody>
+          <a:bodyPr/>
+          <a:lstStyle/>
+          <a:p>
+            <a:pPr marL="342900" indent="-342900">
+              <a:buFont typeface="Arial" panose="020B0604020202020204" pitchFamily="34" charset="0"/>
+              <a:buChar char="•"/>
+            </a:pPr>
+            <a:r>
+              <a:rPr lang="en-US" sz="2400" dirty="0"/>
+              <a:t>Frontend development and polishing</a:t>
+            </a:r>
+          </a:p>
+          <a:p>
+            <a:endParaRPr lang="en-US" sz="2400" dirty="0"/>
+          </a:p>
+          <a:p>
+            <a:pPr marL="342900" indent="-342900">
+              <a:buFont typeface="Arial" panose="020B0604020202020204" pitchFamily="34" charset="0"/>
+              <a:buChar char="•"/>
+            </a:pPr>
+            <a:r>
+              <a:rPr lang="en-US" sz="2400" dirty="0"/>
+              <a:t>Connection of allied users to allow for trading of shared resources</a:t>
+            </a:r>
+          </a:p>
+          <a:p>
+            <a:pPr marL="342900" indent="-342900">
+              <a:buFont typeface="Arial" panose="020B0604020202020204" pitchFamily="34" charset="0"/>
+              <a:buChar char="•"/>
+            </a:pPr>
+            <a:endParaRPr lang="en-US" sz="2400" dirty="0"/>
+          </a:p>
+          <a:p>
+            <a:pPr marL="342900" indent="-342900">
+              <a:buFont typeface="Arial" panose="020B0604020202020204" pitchFamily="34" charset="0"/>
+              <a:buChar char="•"/>
+            </a:pPr>
+            <a:r>
+              <a:rPr lang="en-US" sz="2400" dirty="0"/>
+              <a:t>Finalizing the transaction into a purchase system</a:t>
+            </a:r>
+          </a:p>
+          <a:p>
+            <a:pPr marL="342900" indent="-342900">
+              <a:buFont typeface="Arial" panose="020B0604020202020204" pitchFamily="34" charset="0"/>
+              <a:buChar char="•"/>
+            </a:pPr>
+            <a:endParaRPr lang="en-US" sz="2400" dirty="0"/>
+          </a:p>
+        </p:txBody>
+      </p:sp>
+      <p:sp>
+        <p:nvSpPr>
+          <p:cNvPr id="4" name="Slide Number Placeholder 3">
+            <a:extLst>
+              <a:ext uri="{FF2B5EF4-FFF2-40B4-BE49-F238E27FC236}">
+                <a16:creationId xmlns:a16="http://schemas.microsoft.com/office/drawing/2014/main" id="{8F92018D-07AC-5D0F-2994-E1C874B7ADC1}"/>
+              </a:ext>
+            </a:extLst>
+          </p:cNvPr>
+          <p:cNvSpPr>
+            <a:spLocks noGrp="1"/>
+          </p:cNvSpPr>
+          <p:nvPr>
+            <p:ph type="sldNum" sz="quarter" idx="12"/>
+          </p:nvPr>
+        </p:nvSpPr>
+        <p:spPr/>
+        <p:txBody>
+          <a:bodyPr/>
+          <a:lstStyle/>
+          <a:p>
+            <a:fld id="{C01389E6-C847-4AD0-B56D-D205B2EAB1EE}" type="slidenum">
+              <a:rPr lang="en-US" smtClean="0"/>
+              <a:pPr/>
+              <a:t>6</a:t>
+            </a:fld>
+            <a:endParaRPr lang="en-US" dirty="0"/>
+          </a:p>
+        </p:txBody>
+      </p:sp>
+    </p:spTree>
+    <p:extLst>
+      <p:ext uri="{BB962C8B-B14F-4D97-AF65-F5344CB8AC3E}">
+        <p14:creationId xmlns:p14="http://schemas.microsoft.com/office/powerpoint/2010/main" val="3406341205"/>
+      </p:ext>
+    </p:extLst>
+  </p:cSld>
+  <p:clrMapOvr>
+    <a:masterClrMapping/>
+  </p:clrMapOvr>
+</p:sld>
+</file>
+
+<file path=ppt/slides/slide7.xml><?xml version="1.0" encoding="utf-8"?>
+<p:sld xmlns:a="http://schemas.openxmlformats.org/drawingml/2006/main" xmlns:r="http://schemas.openxmlformats.org/officeDocument/2006/relationships" xmlns:p="http://schemas.openxmlformats.org/presentationml/2006/main">
+  <p:cSld>
+    <p:spTree>
+      <p:nvGrpSpPr>
+        <p:cNvPr id="1" name="">
+          <a:extLst>
+            <a:ext uri="{FF2B5EF4-FFF2-40B4-BE49-F238E27FC236}">
               <a16:creationId xmlns:a16="http://schemas.microsoft.com/office/drawing/2014/main" id="{E18FD17A-4B5A-9A10-34EC-5EAB5B2E1B43}"/>
             </a:ext>
           </a:extLst>
@@ -6598,7 +6939,7 @@
             </a:pPr>
             <a:r>
               <a:rPr lang="en-US" dirty="0"/>
-              <a:t>Phase 1 – complete</a:t>
+              <a:t>Phase 1 – Complete</a:t>
             </a:r>
           </a:p>
           <a:p>
@@ -6615,7 +6956,7 @@
             </a:pPr>
             <a:r>
               <a:rPr lang="en-US" dirty="0"/>
-              <a:t>Phase 2 – complete</a:t>
+              <a:t>Phase 2 – Complete</a:t>
             </a:r>
           </a:p>
           <a:p>
@@ -6632,13 +6973,8 @@
             </a:pPr>
             <a:r>
               <a:rPr lang="en-US" dirty="0"/>
-              <a:t>Phase 3 </a:t>
-            </a:r>
-            <a:r>
-              <a:rPr lang="en-US"/>
-              <a:t>- complete</a:t>
-            </a:r>
-            <a:endParaRPr lang="en-US" dirty="0"/>
+              <a:t>Phase 3 – In progress</a:t>
+            </a:r>
           </a:p>
           <a:p>
             <a:pPr marL="342900" indent="-342900">
@@ -6654,13 +6990,6 @@
             </a:pPr>
             <a:endParaRPr lang="en-US" dirty="0"/>
           </a:p>
-          <a:p>
-            <a:pPr marL="342900" indent="-342900">
-              <a:buFont typeface="Arial" panose="020B0604020202020204" pitchFamily="34" charset="0"/>
-              <a:buChar char="•"/>
-            </a:pPr>
-            <a:endParaRPr lang="en-US" dirty="0"/>
-          </a:p>
         </p:txBody>
       </p:sp>
       <p:sp>
@@ -6687,7 +7016,7 @@
             <a:fld id="{C01389E6-C847-4AD0-B56D-D205B2EAB1EE}" type="slidenum">
               <a:rPr lang="en-US" smtClean="0"/>
               <a:pPr/>
-              <a:t>5</a:t>
+              <a:t>7</a:t>
             </a:fld>
             <a:endParaRPr lang="en-US" dirty="0"/>
           </a:p>
@@ -6706,194 +7035,7 @@
 </p:sld>
 </file>
 
-<file path=ppt/slides/slide6.xml><?xml version="1.0" encoding="utf-8"?>
-<p:sld xmlns:a="http://schemas.openxmlformats.org/drawingml/2006/main" xmlns:r="http://schemas.openxmlformats.org/officeDocument/2006/relationships" xmlns:p="http://schemas.openxmlformats.org/presentationml/2006/main">
-  <p:cSld>
-    <p:spTree>
-      <p:nvGrpSpPr>
-        <p:cNvPr id="1" name=""/>
-        <p:cNvGrpSpPr/>
-        <p:nvPr/>
-      </p:nvGrpSpPr>
-      <p:grpSpPr>
-        <a:xfrm>
-          <a:off x="0" y="0"/>
-          <a:ext cx="0" cy="0"/>
-          <a:chOff x="0" y="0"/>
-          <a:chExt cx="0" cy="0"/>
-        </a:xfrm>
-      </p:grpSpPr>
-      <p:sp>
-        <p:nvSpPr>
-          <p:cNvPr id="2" name="Title 1">
-            <a:extLst>
-              <a:ext uri="{FF2B5EF4-FFF2-40B4-BE49-F238E27FC236}">
-                <a16:creationId xmlns:a16="http://schemas.microsoft.com/office/drawing/2014/main" id="{800D1D41-5286-2B6E-EE70-7893A03CDE7D}"/>
-              </a:ext>
-            </a:extLst>
-          </p:cNvPr>
-          <p:cNvSpPr>
-            <a:spLocks noGrp="1"/>
-          </p:cNvSpPr>
-          <p:nvPr>
-            <p:ph type="title"/>
-          </p:nvPr>
-        </p:nvSpPr>
-        <p:spPr/>
-        <p:txBody>
-          <a:bodyPr/>
-          <a:lstStyle/>
-          <a:p>
-            <a:r>
-              <a:rPr lang="en-US" dirty="0"/>
-              <a:t>Current Challenges</a:t>
-            </a:r>
-          </a:p>
-        </p:txBody>
-      </p:sp>
-      <p:sp>
-        <p:nvSpPr>
-          <p:cNvPr id="3" name="Content Placeholder 2">
-            <a:extLst>
-              <a:ext uri="{FF2B5EF4-FFF2-40B4-BE49-F238E27FC236}">
-                <a16:creationId xmlns:a16="http://schemas.microsoft.com/office/drawing/2014/main" id="{314C37A0-451F-A5BA-50DE-F50D2BE3A817}"/>
-              </a:ext>
-            </a:extLst>
-          </p:cNvPr>
-          <p:cNvSpPr>
-            <a:spLocks noGrp="1"/>
-          </p:cNvSpPr>
-          <p:nvPr>
-            <p:ph idx="13"/>
-          </p:nvPr>
-        </p:nvSpPr>
-        <p:spPr>
-          <a:xfrm>
-            <a:off x="974171" y="2441273"/>
-            <a:ext cx="10116615" cy="3776596"/>
-          </a:xfrm>
-        </p:spPr>
-        <p:txBody>
-          <a:bodyPr/>
-          <a:lstStyle/>
-          <a:p>
-            <a:pPr marL="342900" indent="-342900">
-              <a:buFont typeface="Arial" panose="020B0604020202020204" pitchFamily="34" charset="0"/>
-              <a:buChar char="•"/>
-            </a:pPr>
-            <a:r>
-              <a:rPr lang="en-US" sz="2400" dirty="0"/>
-              <a:t>Significant lack of frontend development.</a:t>
-            </a:r>
-          </a:p>
-          <a:p>
-            <a:pPr marL="342900" indent="-342900">
-              <a:buFont typeface="Arial" panose="020B0604020202020204" pitchFamily="34" charset="0"/>
-              <a:buChar char="•"/>
-            </a:pPr>
-            <a:endParaRPr lang="en-US" sz="2400" dirty="0"/>
-          </a:p>
-          <a:p>
-            <a:pPr marL="342900" indent="-342900">
-              <a:buFont typeface="Arial" panose="020B0604020202020204" pitchFamily="34" charset="0"/>
-              <a:buChar char="•"/>
-            </a:pPr>
-            <a:r>
-              <a:rPr lang="en-US" sz="2400" dirty="0"/>
-              <a:t>Difficulties communicating.</a:t>
-            </a:r>
-          </a:p>
-          <a:p>
-            <a:pPr marL="342900" indent="-342900">
-              <a:buFont typeface="Arial" panose="020B0604020202020204" pitchFamily="34" charset="0"/>
-              <a:buChar char="•"/>
-            </a:pPr>
-            <a:endParaRPr lang="en-US" sz="2400" dirty="0"/>
-          </a:p>
-          <a:p>
-            <a:pPr marL="342900" indent="-342900">
-              <a:buFont typeface="Arial" panose="020B0604020202020204" pitchFamily="34" charset="0"/>
-              <a:buChar char="•"/>
-            </a:pPr>
-            <a:r>
-              <a:rPr lang="en-US" sz="2400" dirty="0"/>
-              <a:t>Unclear expectations for project.</a:t>
-            </a:r>
-          </a:p>
-          <a:p>
-            <a:pPr marL="342900" indent="-342900">
-              <a:buFont typeface="Arial" panose="020B0604020202020204" pitchFamily="34" charset="0"/>
-              <a:buChar char="•"/>
-            </a:pPr>
-            <a:endParaRPr lang="en-US" dirty="0"/>
-          </a:p>
-          <a:p>
-            <a:pPr marL="342900" indent="-342900">
-              <a:buFont typeface="Arial" panose="020B0604020202020204" pitchFamily="34" charset="0"/>
-              <a:buChar char="•"/>
-            </a:pPr>
-            <a:endParaRPr lang="en-US" dirty="0"/>
-          </a:p>
-          <a:p>
-            <a:pPr marL="342900" indent="-342900">
-              <a:buFont typeface="Arial" panose="020B0604020202020204" pitchFamily="34" charset="0"/>
-              <a:buChar char="•"/>
-            </a:pPr>
-            <a:endParaRPr lang="en-US" dirty="0"/>
-          </a:p>
-          <a:p>
-            <a:pPr marL="342900" indent="-342900">
-              <a:buFont typeface="Arial" panose="020B0604020202020204" pitchFamily="34" charset="0"/>
-              <a:buChar char="•"/>
-            </a:pPr>
-            <a:endParaRPr lang="en-US" dirty="0"/>
-          </a:p>
-        </p:txBody>
-      </p:sp>
-      <p:sp>
-        <p:nvSpPr>
-          <p:cNvPr id="5" name="Slide Number Placeholder 4">
-            <a:extLst>
-              <a:ext uri="{FF2B5EF4-FFF2-40B4-BE49-F238E27FC236}">
-                <a16:creationId xmlns:a16="http://schemas.microsoft.com/office/drawing/2014/main" id="{513D02C0-0922-7872-ED77-5519F8213166}"/>
-              </a:ext>
-            </a:extLst>
-          </p:cNvPr>
-          <p:cNvSpPr>
-            <a:spLocks noGrp="1"/>
-          </p:cNvSpPr>
-          <p:nvPr>
-            <p:ph type="sldNum" sz="quarter" idx="12"/>
-          </p:nvPr>
-        </p:nvSpPr>
-        <p:spPr/>
-        <p:txBody>
-          <a:bodyPr/>
-          <a:lstStyle/>
-          <a:p>
-            <a:fld id="{C01389E6-C847-4AD0-B56D-D205B2EAB1EE}" type="slidenum">
-              <a:rPr lang="en-US" smtClean="0"/>
-              <a:pPr/>
-              <a:t>6</a:t>
-            </a:fld>
-            <a:endParaRPr lang="en-US" dirty="0"/>
-          </a:p>
-        </p:txBody>
-      </p:sp>
-    </p:spTree>
-    <p:extLst>
-      <p:ext uri="{BB962C8B-B14F-4D97-AF65-F5344CB8AC3E}">
-        <p14:creationId xmlns:p14="http://schemas.microsoft.com/office/powerpoint/2010/main" val="1811109426"/>
-      </p:ext>
-    </p:extLst>
-  </p:cSld>
-  <p:clrMapOvr>
-    <a:masterClrMapping/>
-  </p:clrMapOvr>
-</p:sld>
-</file>
-
-<file path=ppt/slides/slide7.xml><?xml version="1.0" encoding="utf-8"?>
+<file path=ppt/slides/slide8.xml><?xml version="1.0" encoding="utf-8"?>
 <p:sld xmlns:a="http://schemas.openxmlformats.org/drawingml/2006/main" xmlns:r="http://schemas.openxmlformats.org/officeDocument/2006/relationships" xmlns:p="http://schemas.openxmlformats.org/presentationml/2006/main">
   <p:cSld>
     <p:spTree>
@@ -6968,7 +7110,7 @@
             <a:fld id="{C01389E6-C847-4AD0-B56D-D205B2EAB1EE}" type="slidenum">
               <a:rPr lang="en-US" smtClean="0"/>
               <a:pPr/>
-              <a:t>7</a:t>
+              <a:t>8</a:t>
             </a:fld>
             <a:endParaRPr lang="en-US" dirty="0"/>
           </a:p>
@@ -7166,7 +7308,7 @@
           <a:p>
             <a:r>
               <a:rPr lang="en-US" dirty="0"/>
-              <a:t>Todd Carter – backend</a:t>
+              <a:t>Todd Carter – Backend, Frontend, Presentations, Reports</a:t>
             </a:r>
           </a:p>
           <a:p>
@@ -7181,7 +7323,7 @@
           <a:p>
             <a:r>
               <a:rPr lang="en-US" dirty="0"/>
-              <a:t>Anna Milligan - frontend</a:t>
+              <a:t>Anna Milligan - Frontend</a:t>
             </a:r>
           </a:p>
           <a:p>

</xml_diff>

<commit_message>
Added working remove buttons to Your Offers table on Profile page
</commit_message>
<xml_diff>
--- a/CaravanSeraiCS360/Presentations/Caravanserai.pptx
+++ b/CaravanSeraiCS360/Presentations/Caravanserai.pptx
@@ -6768,19 +6768,6 @@
             </a:r>
           </a:p>
           <a:p>
-            <a:endParaRPr lang="en-US" sz="2400" dirty="0"/>
-          </a:p>
-          <a:p>
-            <a:pPr marL="342900" indent="-342900">
-              <a:buFont typeface="Arial" panose="020B0604020202020204" pitchFamily="34" charset="0"/>
-              <a:buChar char="•"/>
-            </a:pPr>
-            <a:r>
-              <a:rPr lang="en-US" sz="2400" dirty="0"/>
-              <a:t>Connection of allied users to allow for trading of shared resources</a:t>
-            </a:r>
-          </a:p>
-          <a:p>
             <a:pPr marL="342900" indent="-342900">
               <a:buFont typeface="Arial" panose="020B0604020202020204" pitchFamily="34" charset="0"/>
               <a:buChar char="•"/>
@@ -6794,7 +6781,25 @@
             </a:pPr>
             <a:r>
               <a:rPr lang="en-US" sz="2400" dirty="0"/>
-              <a:t>Finalizing the transaction into a purchase system</a:t>
+              <a:t>Improvements to user and </a:t>
+            </a:r>
+            <a:r>
+              <a:rPr lang="en-US" sz="2400"/>
+              <a:t>group security</a:t>
+            </a:r>
+            <a:endParaRPr lang="en-US" sz="2400" dirty="0"/>
+          </a:p>
+          <a:p>
+            <a:endParaRPr lang="en-US" sz="2400" dirty="0"/>
+          </a:p>
+          <a:p>
+            <a:pPr marL="342900" indent="-342900">
+              <a:buFont typeface="Arial" panose="020B0604020202020204" pitchFamily="34" charset="0"/>
+              <a:buChar char="•"/>
+            </a:pPr>
+            <a:r>
+              <a:rPr lang="en-US" sz="2400" dirty="0"/>
+              <a:t>Finalizing the transactions into a purchase system</a:t>
             </a:r>
           </a:p>
           <a:p>
@@ -8145,15 +8150,6 @@
 </file>
 
 <file path=customXml/item1.xml><?xml version="1.0" encoding="utf-8"?>
-<?mso-contentType ?>
-<FormTemplates xmlns="http://schemas.microsoft.com/sharepoint/v3/contenttype/forms">
-  <Display>DocumentLibraryForm</Display>
-  <Edit>DocumentLibraryForm</Edit>
-  <New>DocumentLibraryForm</New>
-</FormTemplates>
-</file>
-
-<file path=customXml/item2.xml><?xml version="1.0" encoding="utf-8"?>
 <ct:contentTypeSchema xmlns:ct="http://schemas.microsoft.com/office/2006/metadata/contentType" xmlns:ma="http://schemas.microsoft.com/office/2006/metadata/properties/metaAttributes" ct:_="" ma:_="" ma:contentTypeName="Document" ma:contentTypeID="0x01010079F111ED35F8CC479449609E8A0923A6" ma:contentTypeVersion="28" ma:contentTypeDescription="Create a new document." ma:contentTypeScope="" ma:versionID="60f5a4f2d2b0abadcf532d48ebf9cb71">
   <xsd:schema xmlns:xsd="http://www.w3.org/2001/XMLSchema" xmlns:xs="http://www.w3.org/2001/XMLSchema" xmlns:p="http://schemas.microsoft.com/office/2006/metadata/properties" xmlns:ns1="http://schemas.microsoft.com/sharepoint/v3" xmlns:ns2="71af3243-3dd4-4a8d-8c0d-dd76da1f02a5" xmlns:ns3="16c05727-aa75-4e4a-9b5f-8a80a1165891" xmlns:ns4="230e9df3-be65-4c73-a93b-d1236ebd677e" targetNamespace="http://schemas.microsoft.com/office/2006/metadata/properties" ma:root="true" ma:fieldsID="7dd78129e6a1811f84807ad11c651531" ns1:_="" ns2:_="" ns3:_="" ns4:_="">
     <xsd:import namespace="http://schemas.microsoft.com/sharepoint/v3"/>
@@ -8465,6 +8461,15 @@
 </ct:contentTypeSchema>
 </file>
 
+<file path=customXml/item2.xml><?xml version="1.0" encoding="utf-8"?>
+<?mso-contentType ?>
+<FormTemplates xmlns="http://schemas.microsoft.com/sharepoint/v3/contenttype/forms">
+  <Display>DocumentLibraryForm</Display>
+  <Edit>DocumentLibraryForm</Edit>
+  <New>DocumentLibraryForm</New>
+</FormTemplates>
+</file>
+
 <file path=customXml/item3.xml><?xml version="1.0" encoding="utf-8"?>
 <p:properties xmlns:p="http://schemas.microsoft.com/office/2006/metadata/properties" xmlns:xsi="http://www.w3.org/2001/XMLSchema-instance" xmlns:pc="http://schemas.microsoft.com/office/infopath/2007/PartnerControls">
   <documentManagement>
@@ -8486,14 +8491,6 @@
 </file>
 
 <file path=customXml/itemProps1.xml><?xml version="1.0" encoding="utf-8"?>
-<ds:datastoreItem xmlns:ds="http://schemas.openxmlformats.org/officeDocument/2006/customXml" ds:itemID="{8CF92924-243E-4C73-8BD6-689D14A495F2}">
-  <ds:schemaRefs>
-    <ds:schemaRef ds:uri="http://schemas.microsoft.com/sharepoint/v3/contenttype/forms"/>
-  </ds:schemaRefs>
-</ds:datastoreItem>
-</file>
-
-<file path=customXml/itemProps2.xml><?xml version="1.0" encoding="utf-8"?>
 <ds:datastoreItem xmlns:ds="http://schemas.openxmlformats.org/officeDocument/2006/customXml" ds:itemID="{0D54F37A-6805-42D4-9FB4-3CFF01A7B973}">
   <ds:schemaRefs>
     <ds:schemaRef ds:uri="http://schemas.microsoft.com/office/2006/metadata/contentType"/>
@@ -8514,6 +8511,14 @@
 </ds:datastoreItem>
 </file>
 
+<file path=customXml/itemProps2.xml><?xml version="1.0" encoding="utf-8"?>
+<ds:datastoreItem xmlns:ds="http://schemas.openxmlformats.org/officeDocument/2006/customXml" ds:itemID="{8CF92924-243E-4C73-8BD6-689D14A495F2}">
+  <ds:schemaRefs>
+    <ds:schemaRef ds:uri="http://schemas.microsoft.com/sharepoint/v3/contenttype/forms"/>
+  </ds:schemaRefs>
+</ds:datastoreItem>
+</file>
+
 <file path=customXml/itemProps3.xml><?xml version="1.0" encoding="utf-8"?>
 <ds:datastoreItem xmlns:ds="http://schemas.openxmlformats.org/officeDocument/2006/customXml" ds:itemID="{51D389B5-45E8-4EA7-B5A7-604FF249CF70}">
   <ds:schemaRefs>

</xml_diff>

<commit_message>
Recolored navbar and quality of life stuff
</commit_message>
<xml_diff>
--- a/CaravanSeraiCS360/Presentations/Caravanserai.pptx
+++ b/CaravanSeraiCS360/Presentations/Caravanserai.pptx
@@ -6668,6 +6668,23 @@
               <a:t>Message and Barter system</a:t>
             </a:r>
           </a:p>
+          <a:p>
+            <a:pPr marL="342900" indent="-342900">
+              <a:buFont typeface="Arial" panose="020B0604020202020204" pitchFamily="34" charset="0"/>
+              <a:buChar char="•"/>
+            </a:pPr>
+            <a:endParaRPr lang="en-US" sz="2400" dirty="0"/>
+          </a:p>
+          <a:p>
+            <a:pPr marL="342900" indent="-342900">
+              <a:buFont typeface="Arial" panose="020B0604020202020204" pitchFamily="34" charset="0"/>
+              <a:buChar char="•"/>
+            </a:pPr>
+            <a:r>
+              <a:rPr lang="en-US" sz="2400" dirty="0"/>
+              <a:t>Shared inventory between group members</a:t>
+            </a:r>
+          </a:p>
         </p:txBody>
       </p:sp>
       <p:sp>
@@ -6821,11 +6838,11 @@
             </a:pPr>
             <a:r>
               <a:rPr lang="en-US" sz="2400" dirty="0"/>
-              <a:t>Quality of life and </a:t>
+              <a:t>Finalize </a:t>
             </a:r>
             <a:r>
               <a:rPr lang="en-US" sz="2400"/>
-              <a:t>finalizing backend</a:t>
+              <a:t>bartering process</a:t>
             </a:r>
             <a:endParaRPr lang="en-US" sz="2400" dirty="0"/>
           </a:p>

</xml_diff>